<commit_message>
* Add call for sessions
</commit_message>
<xml_diff>
--- a/docs/img/logos/all_logos.pptx
+++ b/docs/img/logos/all_logos.pptx
@@ -261,7 +261,7 @@
           <a:p>
             <a:fld id="{85E7ECC7-3E81-49E8-A01E-D8E37EFD5064}" type="datetimeFigureOut">
               <a:rPr lang="de-CH" smtClean="0"/>
-              <a:t>11.05.2022</a:t>
+              <a:t>17.06.2022</a:t>
             </a:fld>
             <a:endParaRPr lang="de-CH"/>
           </a:p>
@@ -461,7 +461,7 @@
           <a:p>
             <a:fld id="{85E7ECC7-3E81-49E8-A01E-D8E37EFD5064}" type="datetimeFigureOut">
               <a:rPr lang="de-CH" smtClean="0"/>
-              <a:t>11.05.2022</a:t>
+              <a:t>17.06.2022</a:t>
             </a:fld>
             <a:endParaRPr lang="de-CH"/>
           </a:p>
@@ -671,7 +671,7 @@
           <a:p>
             <a:fld id="{85E7ECC7-3E81-49E8-A01E-D8E37EFD5064}" type="datetimeFigureOut">
               <a:rPr lang="de-CH" smtClean="0"/>
-              <a:t>11.05.2022</a:t>
+              <a:t>17.06.2022</a:t>
             </a:fld>
             <a:endParaRPr lang="de-CH"/>
           </a:p>
@@ -871,7 +871,7 @@
           <a:p>
             <a:fld id="{85E7ECC7-3E81-49E8-A01E-D8E37EFD5064}" type="datetimeFigureOut">
               <a:rPr lang="de-CH" smtClean="0"/>
-              <a:t>11.05.2022</a:t>
+              <a:t>17.06.2022</a:t>
             </a:fld>
             <a:endParaRPr lang="de-CH"/>
           </a:p>
@@ -1147,7 +1147,7 @@
           <a:p>
             <a:fld id="{85E7ECC7-3E81-49E8-A01E-D8E37EFD5064}" type="datetimeFigureOut">
               <a:rPr lang="de-CH" smtClean="0"/>
-              <a:t>11.05.2022</a:t>
+              <a:t>17.06.2022</a:t>
             </a:fld>
             <a:endParaRPr lang="de-CH"/>
           </a:p>
@@ -1415,7 +1415,7 @@
           <a:p>
             <a:fld id="{85E7ECC7-3E81-49E8-A01E-D8E37EFD5064}" type="datetimeFigureOut">
               <a:rPr lang="de-CH" smtClean="0"/>
-              <a:t>11.05.2022</a:t>
+              <a:t>17.06.2022</a:t>
             </a:fld>
             <a:endParaRPr lang="de-CH"/>
           </a:p>
@@ -1830,7 +1830,7 @@
           <a:p>
             <a:fld id="{85E7ECC7-3E81-49E8-A01E-D8E37EFD5064}" type="datetimeFigureOut">
               <a:rPr lang="de-CH" smtClean="0"/>
-              <a:t>11.05.2022</a:t>
+              <a:t>17.06.2022</a:t>
             </a:fld>
             <a:endParaRPr lang="de-CH"/>
           </a:p>
@@ -1972,7 +1972,7 @@
           <a:p>
             <a:fld id="{85E7ECC7-3E81-49E8-A01E-D8E37EFD5064}" type="datetimeFigureOut">
               <a:rPr lang="de-CH" smtClean="0"/>
-              <a:t>11.05.2022</a:t>
+              <a:t>17.06.2022</a:t>
             </a:fld>
             <a:endParaRPr lang="de-CH"/>
           </a:p>
@@ -2085,7 +2085,7 @@
           <a:p>
             <a:fld id="{85E7ECC7-3E81-49E8-A01E-D8E37EFD5064}" type="datetimeFigureOut">
               <a:rPr lang="de-CH" smtClean="0"/>
-              <a:t>11.05.2022</a:t>
+              <a:t>17.06.2022</a:t>
             </a:fld>
             <a:endParaRPr lang="de-CH"/>
           </a:p>
@@ -2398,7 +2398,7 @@
           <a:p>
             <a:fld id="{85E7ECC7-3E81-49E8-A01E-D8E37EFD5064}" type="datetimeFigureOut">
               <a:rPr lang="de-CH" smtClean="0"/>
-              <a:t>11.05.2022</a:t>
+              <a:t>17.06.2022</a:t>
             </a:fld>
             <a:endParaRPr lang="de-CH"/>
           </a:p>
@@ -2687,7 +2687,7 @@
           <a:p>
             <a:fld id="{85E7ECC7-3E81-49E8-A01E-D8E37EFD5064}" type="datetimeFigureOut">
               <a:rPr lang="de-CH" smtClean="0"/>
-              <a:t>11.05.2022</a:t>
+              <a:t>17.06.2022</a:t>
             </a:fld>
             <a:endParaRPr lang="de-CH"/>
           </a:p>
@@ -2930,7 +2930,7 @@
           <a:p>
             <a:fld id="{85E7ECC7-3E81-49E8-A01E-D8E37EFD5064}" type="datetimeFigureOut">
               <a:rPr lang="de-CH" smtClean="0"/>
-              <a:t>11.05.2022</a:t>
+              <a:t>17.06.2022</a:t>
             </a:fld>
             <a:endParaRPr lang="de-CH"/>
           </a:p>
@@ -3347,6 +3347,58 @@
           <a:chExt cx="0" cy="0"/>
         </a:xfrm>
       </p:grpSpPr>
+      <p:sp>
+        <p:nvSpPr>
+          <p:cNvPr id="8" name="Rectangle 7">
+            <a:extLst>
+              <a:ext uri="{FF2B5EF4-FFF2-40B4-BE49-F238E27FC236}">
+                <a16:creationId xmlns:a16="http://schemas.microsoft.com/office/drawing/2014/main" id="{CAA7FFF8-0B55-48A6-A09E-B6F6306804A7}"/>
+              </a:ext>
+            </a:extLst>
+          </p:cNvPr>
+          <p:cNvSpPr/>
+          <p:nvPr/>
+        </p:nvSpPr>
+        <p:spPr>
+          <a:xfrm>
+            <a:off x="3154388" y="1321196"/>
+            <a:ext cx="5890269" cy="2107804"/>
+          </a:xfrm>
+          <a:prstGeom prst="rect">
+            <a:avLst/>
+          </a:prstGeom>
+          <a:solidFill>
+            <a:schemeClr val="bg1"/>
+          </a:solidFill>
+          <a:ln>
+            <a:noFill/>
+          </a:ln>
+        </p:spPr>
+        <p:style>
+          <a:lnRef idx="2">
+            <a:schemeClr val="accent1">
+              <a:shade val="50000"/>
+            </a:schemeClr>
+          </a:lnRef>
+          <a:fillRef idx="1">
+            <a:schemeClr val="accent1"/>
+          </a:fillRef>
+          <a:effectRef idx="0">
+            <a:schemeClr val="accent1"/>
+          </a:effectRef>
+          <a:fontRef idx="minor">
+            <a:schemeClr val="lt1"/>
+          </a:fontRef>
+        </p:style>
+        <p:txBody>
+          <a:bodyPr rtlCol="0" anchor="ctr"/>
+          <a:lstStyle/>
+          <a:p>
+            <a:pPr algn="ctr"/>
+            <a:endParaRPr lang="de-CH"/>
+          </a:p>
+        </p:txBody>
+      </p:sp>
       <p:pic>
         <p:nvPicPr>
           <p:cNvPr id="7" name="Picture 6" descr="A picture containing shape&#10;&#10;Description automatically generated">
@@ -3493,6 +3545,81 @@
           <a:xfrm>
             <a:off x="4359170" y="2926361"/>
             <a:ext cx="2509625" cy="479210"/>
+          </a:xfrm>
+          <a:prstGeom prst="rect">
+            <a:avLst/>
+          </a:prstGeom>
+          <a:effectLst>
+            <a:softEdge rad="31750"/>
+          </a:effectLst>
+        </p:spPr>
+      </p:pic>
+      <p:pic>
+        <p:nvPicPr>
+          <p:cNvPr id="4" name="Picture 3" descr="A picture containing text&#10;&#10;Description automatically generated">
+            <a:extLst>
+              <a:ext uri="{FF2B5EF4-FFF2-40B4-BE49-F238E27FC236}">
+                <a16:creationId xmlns:a16="http://schemas.microsoft.com/office/drawing/2014/main" id="{E9CFDEA3-AEB7-4D1F-9C02-52F6220B99D5}"/>
+              </a:ext>
+            </a:extLst>
+          </p:cNvPr>
+          <p:cNvPicPr>
+            <a:picLocks noChangeAspect="1"/>
+          </p:cNvPicPr>
+          <p:nvPr/>
+        </p:nvPicPr>
+        <p:blipFill>
+          <a:blip r:embed="rId6">
+            <a:extLst>
+              <a:ext uri="{28A0092B-C50C-407E-A947-70E740481C1C}">
+                <a14:useLocalDpi xmlns:a14="http://schemas.microsoft.com/office/drawing/2010/main" val="0"/>
+              </a:ext>
+            </a:extLst>
+          </a:blip>
+          <a:stretch>
+            <a:fillRect/>
+          </a:stretch>
+        </p:blipFill>
+        <p:spPr>
+          <a:xfrm>
+            <a:off x="3154388" y="1321196"/>
+            <a:ext cx="1000930" cy="2084375"/>
+          </a:xfrm>
+          <a:prstGeom prst="rect">
+            <a:avLst/>
+          </a:prstGeom>
+        </p:spPr>
+      </p:pic>
+      <p:pic>
+        <p:nvPicPr>
+          <p:cNvPr id="6" name="Picture 5" descr="A picture containing text&#10;&#10;Description automatically generated">
+            <a:extLst>
+              <a:ext uri="{FF2B5EF4-FFF2-40B4-BE49-F238E27FC236}">
+                <a16:creationId xmlns:a16="http://schemas.microsoft.com/office/drawing/2014/main" id="{75BC3CDD-C3B5-4DDE-B0A0-9BF1C560C497}"/>
+              </a:ext>
+            </a:extLst>
+          </p:cNvPr>
+          <p:cNvPicPr>
+            <a:picLocks noChangeAspect="1"/>
+          </p:cNvPicPr>
+          <p:nvPr/>
+        </p:nvPicPr>
+        <p:blipFill>
+          <a:blip r:embed="rId7">
+            <a:extLst>
+              <a:ext uri="{28A0092B-C50C-407E-A947-70E740481C1C}">
+                <a14:useLocalDpi xmlns:a14="http://schemas.microsoft.com/office/drawing/2010/main" val="0"/>
+              </a:ext>
+            </a:extLst>
+          </a:blip>
+          <a:stretch>
+            <a:fillRect/>
+          </a:stretch>
+        </p:blipFill>
+        <p:spPr>
+          <a:xfrm>
+            <a:off x="7028710" y="1969416"/>
+            <a:ext cx="2015947" cy="660134"/>
           </a:xfrm>
           <a:prstGeom prst="rect">
             <a:avLst/>

</xml_diff>